<commit_message>
Practica 03 is done
</commit_message>
<xml_diff>
--- a/Presentaciones/Clase03_25.03.25.pptx
+++ b/Presentaciones/Clase03_25.03.25.pptx
@@ -13,9 +13,8 @@
     <p:sldId id="261" r:id="rId7"/>
     <p:sldId id="262" r:id="rId8"/>
     <p:sldId id="263" r:id="rId9"/>
-    <p:sldId id="264" r:id="rId10"/>
-    <p:sldId id="265" r:id="rId11"/>
-    <p:sldId id="266" r:id="rId12"/>
+    <p:sldId id="265" r:id="rId10"/>
+    <p:sldId id="266" r:id="rId11"/>
   </p:sldIdLst>
   <p:sldSz cx="12192000" cy="6858000"/>
   <p:notesSz cx="6858000" cy="9144000"/>
@@ -114,6 +113,11 @@
       </a:defRPr>
     </a:lvl9pPr>
   </p:defaultTextStyle>
+  <p:extLst>
+    <p:ext uri="{EFAFB233-063F-42B5-8137-9DF3F51BA10A}">
+      <p15:sldGuideLst xmlns:p15="http://schemas.microsoft.com/office/powerpoint/2012/main"/>
+    </p:ext>
+  </p:extLst>
 </p:presentation>
 </file>
 
@@ -266,7 +270,7 @@
           <a:p>
             <a:fld id="{C7B02BC0-83C0-45C1-ADDD-4551AFEF66F7}" type="datetimeFigureOut">
               <a:rPr lang="en-US" smtClean="0"/>
-              <a:t>3/25/2025</a:t>
+              <a:t>4/27/2025</a:t>
             </a:fld>
             <a:endParaRPr lang="en-US"/>
           </a:p>
@@ -466,7 +470,7 @@
           <a:p>
             <a:fld id="{C7B02BC0-83C0-45C1-ADDD-4551AFEF66F7}" type="datetimeFigureOut">
               <a:rPr lang="en-US" smtClean="0"/>
-              <a:t>3/25/2025</a:t>
+              <a:t>4/27/2025</a:t>
             </a:fld>
             <a:endParaRPr lang="en-US"/>
           </a:p>
@@ -676,7 +680,7 @@
           <a:p>
             <a:fld id="{C7B02BC0-83C0-45C1-ADDD-4551AFEF66F7}" type="datetimeFigureOut">
               <a:rPr lang="en-US" smtClean="0"/>
-              <a:t>3/25/2025</a:t>
+              <a:t>4/27/2025</a:t>
             </a:fld>
             <a:endParaRPr lang="en-US"/>
           </a:p>
@@ -876,7 +880,7 @@
           <a:p>
             <a:fld id="{C7B02BC0-83C0-45C1-ADDD-4551AFEF66F7}" type="datetimeFigureOut">
               <a:rPr lang="en-US" smtClean="0"/>
-              <a:t>3/25/2025</a:t>
+              <a:t>4/27/2025</a:t>
             </a:fld>
             <a:endParaRPr lang="en-US"/>
           </a:p>
@@ -1152,7 +1156,7 @@
           <a:p>
             <a:fld id="{C7B02BC0-83C0-45C1-ADDD-4551AFEF66F7}" type="datetimeFigureOut">
               <a:rPr lang="en-US" smtClean="0"/>
-              <a:t>3/25/2025</a:t>
+              <a:t>4/27/2025</a:t>
             </a:fld>
             <a:endParaRPr lang="en-US"/>
           </a:p>
@@ -1420,7 +1424,7 @@
           <a:p>
             <a:fld id="{C7B02BC0-83C0-45C1-ADDD-4551AFEF66F7}" type="datetimeFigureOut">
               <a:rPr lang="en-US" smtClean="0"/>
-              <a:t>3/25/2025</a:t>
+              <a:t>4/27/2025</a:t>
             </a:fld>
             <a:endParaRPr lang="en-US"/>
           </a:p>
@@ -1835,7 +1839,7 @@
           <a:p>
             <a:fld id="{C7B02BC0-83C0-45C1-ADDD-4551AFEF66F7}" type="datetimeFigureOut">
               <a:rPr lang="en-US" smtClean="0"/>
-              <a:t>3/25/2025</a:t>
+              <a:t>4/27/2025</a:t>
             </a:fld>
             <a:endParaRPr lang="en-US"/>
           </a:p>
@@ -1977,7 +1981,7 @@
           <a:p>
             <a:fld id="{C7B02BC0-83C0-45C1-ADDD-4551AFEF66F7}" type="datetimeFigureOut">
               <a:rPr lang="en-US" smtClean="0"/>
-              <a:t>3/25/2025</a:t>
+              <a:t>4/27/2025</a:t>
             </a:fld>
             <a:endParaRPr lang="en-US"/>
           </a:p>
@@ -2090,7 +2094,7 @@
           <a:p>
             <a:fld id="{C7B02BC0-83C0-45C1-ADDD-4551AFEF66F7}" type="datetimeFigureOut">
               <a:rPr lang="en-US" smtClean="0"/>
-              <a:t>3/25/2025</a:t>
+              <a:t>4/27/2025</a:t>
             </a:fld>
             <a:endParaRPr lang="en-US"/>
           </a:p>
@@ -2403,7 +2407,7 @@
           <a:p>
             <a:fld id="{C7B02BC0-83C0-45C1-ADDD-4551AFEF66F7}" type="datetimeFigureOut">
               <a:rPr lang="en-US" smtClean="0"/>
-              <a:t>3/25/2025</a:t>
+              <a:t>4/27/2025</a:t>
             </a:fld>
             <a:endParaRPr lang="en-US"/>
           </a:p>
@@ -2692,7 +2696,7 @@
           <a:p>
             <a:fld id="{C7B02BC0-83C0-45C1-ADDD-4551AFEF66F7}" type="datetimeFigureOut">
               <a:rPr lang="en-US" smtClean="0"/>
-              <a:t>3/25/2025</a:t>
+              <a:t>4/27/2025</a:t>
             </a:fld>
             <a:endParaRPr lang="en-US"/>
           </a:p>
@@ -2935,7 +2939,7 @@
           <a:p>
             <a:fld id="{C7B02BC0-83C0-45C1-ADDD-4551AFEF66F7}" type="datetimeFigureOut">
               <a:rPr lang="en-US" smtClean="0"/>
-              <a:t>3/25/2025</a:t>
+              <a:t>4/27/2025</a:t>
             </a:fld>
             <a:endParaRPr lang="en-US"/>
           </a:p>
@@ -3412,40 +3416,40 @@
           <a:chExt cx="0" cy="0"/>
         </a:xfrm>
       </p:grpSpPr>
+      <p:pic>
+        <p:nvPicPr>
+          <p:cNvPr id="5" name="Imagen 4">
+            <a:extLst>
+              <a:ext uri="{FF2B5EF4-FFF2-40B4-BE49-F238E27FC236}">
+                <a16:creationId xmlns:a16="http://schemas.microsoft.com/office/drawing/2014/main" id="{7464858E-6D37-B48F-751A-D2C237234046}"/>
+              </a:ext>
+            </a:extLst>
+          </p:cNvPr>
+          <p:cNvPicPr>
+            <a:picLocks noChangeAspect="1"/>
+          </p:cNvPicPr>
+          <p:nvPr/>
+        </p:nvPicPr>
+        <p:blipFill>
+          <a:blip r:embed="rId2"/>
+          <a:stretch>
+            <a:fillRect/>
+          </a:stretch>
+        </p:blipFill>
+        <p:spPr>
+          <a:xfrm>
+            <a:off x="2852285" y="418680"/>
+            <a:ext cx="6487430" cy="6020640"/>
+          </a:xfrm>
+          <a:prstGeom prst="rect">
+            <a:avLst/>
+          </a:prstGeom>
+        </p:spPr>
+      </p:pic>
     </p:spTree>
     <p:extLst>
       <p:ext uri="{BB962C8B-B14F-4D97-AF65-F5344CB8AC3E}">
-        <p14:creationId xmlns:p14="http://schemas.microsoft.com/office/powerpoint/2010/main" val="3575451722"/>
-      </p:ext>
-    </p:extLst>
-  </p:cSld>
-  <p:clrMapOvr>
-    <a:masterClrMapping/>
-  </p:clrMapOvr>
-</p:sld>
-</file>
-
-<file path=ppt/slides/slide11.xml><?xml version="1.0" encoding="utf-8"?>
-<p:sld xmlns:a="http://schemas.openxmlformats.org/drawingml/2006/main" xmlns:r="http://schemas.openxmlformats.org/officeDocument/2006/relationships" xmlns:p="http://schemas.openxmlformats.org/presentationml/2006/main">
-  <p:cSld>
-    <p:spTree>
-      <p:nvGrpSpPr>
-        <p:cNvPr id="1" name=""/>
-        <p:cNvGrpSpPr/>
-        <p:nvPr/>
-      </p:nvGrpSpPr>
-      <p:grpSpPr>
-        <a:xfrm>
-          <a:off x="0" y="0"/>
-          <a:ext cx="0" cy="0"/>
-          <a:chOff x="0" y="0"/>
-          <a:chExt cx="0" cy="0"/>
-        </a:xfrm>
-      </p:grpSpPr>
-    </p:spTree>
-    <p:extLst>
-      <p:ext uri="{BB962C8B-B14F-4D97-AF65-F5344CB8AC3E}">
-        <p14:creationId xmlns:p14="http://schemas.microsoft.com/office/powerpoint/2010/main" val="4087840347"/>
+        <p14:creationId xmlns:p14="http://schemas.microsoft.com/office/powerpoint/2010/main" val="3304994043"/>
       </p:ext>
     </p:extLst>
   </p:cSld>
@@ -3712,6 +3716,71 @@
           <a:chExt cx="0" cy="0"/>
         </a:xfrm>
       </p:grpSpPr>
+      <p:pic>
+        <p:nvPicPr>
+          <p:cNvPr id="3" name="Imagen 2">
+            <a:extLst>
+              <a:ext uri="{FF2B5EF4-FFF2-40B4-BE49-F238E27FC236}">
+                <a16:creationId xmlns:a16="http://schemas.microsoft.com/office/drawing/2014/main" id="{91B69D30-3614-6186-5D49-370FF34D9D51}"/>
+              </a:ext>
+            </a:extLst>
+          </p:cNvPr>
+          <p:cNvPicPr>
+            <a:picLocks noChangeAspect="1"/>
+          </p:cNvPicPr>
+          <p:nvPr/>
+        </p:nvPicPr>
+        <p:blipFill>
+          <a:blip r:embed="rId2"/>
+          <a:stretch>
+            <a:fillRect/>
+          </a:stretch>
+        </p:blipFill>
+        <p:spPr>
+          <a:xfrm>
+            <a:off x="2733205" y="770675"/>
+            <a:ext cx="6725589" cy="6087325"/>
+          </a:xfrm>
+          <a:prstGeom prst="rect">
+            <a:avLst/>
+          </a:prstGeom>
+        </p:spPr>
+      </p:pic>
+      <p:sp>
+        <p:nvSpPr>
+          <p:cNvPr id="4" name="CuadroTexto 3">
+            <a:extLst>
+              <a:ext uri="{FF2B5EF4-FFF2-40B4-BE49-F238E27FC236}">
+                <a16:creationId xmlns:a16="http://schemas.microsoft.com/office/drawing/2014/main" id="{A7F5F104-5AD2-F992-29EF-0A4134783F3A}"/>
+              </a:ext>
+            </a:extLst>
+          </p:cNvPr>
+          <p:cNvSpPr txBox="1"/>
+          <p:nvPr/>
+        </p:nvSpPr>
+        <p:spPr>
+          <a:xfrm>
+            <a:off x="2910348" y="196645"/>
+            <a:ext cx="5761704" cy="369332"/>
+          </a:xfrm>
+          <a:prstGeom prst="rect">
+            <a:avLst/>
+          </a:prstGeom>
+          <a:noFill/>
+        </p:spPr>
+        <p:txBody>
+          <a:bodyPr wrap="square" rtlCol="0">
+            <a:spAutoFit/>
+          </a:bodyPr>
+          <a:lstStyle/>
+          <a:p>
+            <a:r>
+              <a:rPr lang="es-MX" dirty="0"/>
+              <a:t>Ejemplos del uso de métodos en situaciones cotidianas:</a:t>
+            </a:r>
+          </a:p>
+        </p:txBody>
+      </p:sp>
     </p:spTree>
     <p:extLst>
       <p:ext uri="{BB962C8B-B14F-4D97-AF65-F5344CB8AC3E}">
@@ -3742,6 +3811,79 @@
           <a:chExt cx="0" cy="0"/>
         </a:xfrm>
       </p:grpSpPr>
+      <p:pic>
+        <p:nvPicPr>
+          <p:cNvPr id="3" name="Imagen 2">
+            <a:extLst>
+              <a:ext uri="{FF2B5EF4-FFF2-40B4-BE49-F238E27FC236}">
+                <a16:creationId xmlns:a16="http://schemas.microsoft.com/office/drawing/2014/main" id="{B9AEC542-C5FB-DAF4-34AD-4D6161A22F4B}"/>
+              </a:ext>
+            </a:extLst>
+          </p:cNvPr>
+          <p:cNvPicPr>
+            <a:picLocks noChangeAspect="1"/>
+          </p:cNvPicPr>
+          <p:nvPr/>
+        </p:nvPicPr>
+        <p:blipFill>
+          <a:blip r:embed="rId2"/>
+          <a:stretch>
+            <a:fillRect/>
+          </a:stretch>
+        </p:blipFill>
+        <p:spPr>
+          <a:xfrm>
+            <a:off x="401264" y="1333556"/>
+            <a:ext cx="11212490" cy="3600953"/>
+          </a:xfrm>
+          <a:prstGeom prst="rect">
+            <a:avLst/>
+          </a:prstGeom>
+        </p:spPr>
+      </p:pic>
+      <p:sp>
+        <p:nvSpPr>
+          <p:cNvPr id="4" name="CuadroTexto 3">
+            <a:extLst>
+              <a:ext uri="{FF2B5EF4-FFF2-40B4-BE49-F238E27FC236}">
+                <a16:creationId xmlns:a16="http://schemas.microsoft.com/office/drawing/2014/main" id="{A97CDBC3-ED6F-84AE-333A-448D25BECF3A}"/>
+              </a:ext>
+            </a:extLst>
+          </p:cNvPr>
+          <p:cNvSpPr txBox="1"/>
+          <p:nvPr/>
+        </p:nvSpPr>
+        <p:spPr>
+          <a:xfrm>
+            <a:off x="1130710" y="511277"/>
+            <a:ext cx="6656438" cy="369332"/>
+          </a:xfrm>
+          <a:prstGeom prst="rect">
+            <a:avLst/>
+          </a:prstGeom>
+          <a:noFill/>
+        </p:spPr>
+        <p:txBody>
+          <a:bodyPr wrap="square" rtlCol="0">
+            <a:spAutoFit/>
+          </a:bodyPr>
+          <a:lstStyle/>
+          <a:p>
+            <a:r>
+              <a:rPr lang="es-MX" dirty="0"/>
+              <a:t>Método </a:t>
+            </a:r>
+            <a:r>
+              <a:rPr lang="es-MX" dirty="0" err="1"/>
+              <a:t>Sort</a:t>
+            </a:r>
+            <a:r>
+              <a:rPr lang="es-MX" dirty="0"/>
+              <a:t> con aplicación para ordenar arreglos.</a:t>
+            </a:r>
+          </a:p>
+        </p:txBody>
+      </p:sp>
     </p:spTree>
     <p:extLst>
       <p:ext uri="{BB962C8B-B14F-4D97-AF65-F5344CB8AC3E}">
@@ -3772,10 +3914,70 @@
           <a:chExt cx="0" cy="0"/>
         </a:xfrm>
       </p:grpSpPr>
+      <p:pic>
+        <p:nvPicPr>
+          <p:cNvPr id="3" name="Imagen 2">
+            <a:extLst>
+              <a:ext uri="{FF2B5EF4-FFF2-40B4-BE49-F238E27FC236}">
+                <a16:creationId xmlns:a16="http://schemas.microsoft.com/office/drawing/2014/main" id="{8B2DA9C9-410B-69B2-503B-CF55F4A730D9}"/>
+              </a:ext>
+            </a:extLst>
+          </p:cNvPr>
+          <p:cNvPicPr>
+            <a:picLocks noChangeAspect="1"/>
+          </p:cNvPicPr>
+          <p:nvPr/>
+        </p:nvPicPr>
+        <p:blipFill>
+          <a:blip r:embed="rId2"/>
+          <a:stretch>
+            <a:fillRect/>
+          </a:stretch>
+        </p:blipFill>
+        <p:spPr>
+          <a:xfrm>
+            <a:off x="527860" y="37148"/>
+            <a:ext cx="10694069" cy="3375630"/>
+          </a:xfrm>
+          <a:prstGeom prst="rect">
+            <a:avLst/>
+          </a:prstGeom>
+        </p:spPr>
+      </p:pic>
+      <p:pic>
+        <p:nvPicPr>
+          <p:cNvPr id="4" name="Imagen 3">
+            <a:extLst>
+              <a:ext uri="{FF2B5EF4-FFF2-40B4-BE49-F238E27FC236}">
+                <a16:creationId xmlns:a16="http://schemas.microsoft.com/office/drawing/2014/main" id="{7897DD78-9D9C-32EB-46F2-3BBDA68C2023}"/>
+              </a:ext>
+            </a:extLst>
+          </p:cNvPr>
+          <p:cNvPicPr>
+            <a:picLocks noChangeAspect="1"/>
+          </p:cNvPicPr>
+          <p:nvPr/>
+        </p:nvPicPr>
+        <p:blipFill>
+          <a:blip r:embed="rId3"/>
+          <a:stretch>
+            <a:fillRect/>
+          </a:stretch>
+        </p:blipFill>
+        <p:spPr>
+          <a:xfrm>
+            <a:off x="542149" y="3621190"/>
+            <a:ext cx="10666625" cy="3174373"/>
+          </a:xfrm>
+          <a:prstGeom prst="rect">
+            <a:avLst/>
+          </a:prstGeom>
+        </p:spPr>
+      </p:pic>
     </p:spTree>
     <p:extLst>
       <p:ext uri="{BB962C8B-B14F-4D97-AF65-F5344CB8AC3E}">
-        <p14:creationId xmlns:p14="http://schemas.microsoft.com/office/powerpoint/2010/main" val="1782185556"/>
+        <p14:creationId xmlns:p14="http://schemas.microsoft.com/office/powerpoint/2010/main" val="1384293583"/>
       </p:ext>
     </p:extLst>
   </p:cSld>
@@ -3802,10 +4004,70 @@
           <a:chExt cx="0" cy="0"/>
         </a:xfrm>
       </p:grpSpPr>
+      <p:pic>
+        <p:nvPicPr>
+          <p:cNvPr id="3" name="Imagen 2">
+            <a:extLst>
+              <a:ext uri="{FF2B5EF4-FFF2-40B4-BE49-F238E27FC236}">
+                <a16:creationId xmlns:a16="http://schemas.microsoft.com/office/drawing/2014/main" id="{69F8C992-AD6B-943B-720D-B50C4228DAA3}"/>
+              </a:ext>
+            </a:extLst>
+          </p:cNvPr>
+          <p:cNvPicPr>
+            <a:picLocks noChangeAspect="1"/>
+          </p:cNvPicPr>
+          <p:nvPr/>
+        </p:nvPicPr>
+        <p:blipFill>
+          <a:blip r:embed="rId2"/>
+          <a:stretch>
+            <a:fillRect/>
+          </a:stretch>
+        </p:blipFill>
+        <p:spPr>
+          <a:xfrm>
+            <a:off x="546913" y="91939"/>
+            <a:ext cx="10849714" cy="3352702"/>
+          </a:xfrm>
+          <a:prstGeom prst="rect">
+            <a:avLst/>
+          </a:prstGeom>
+        </p:spPr>
+      </p:pic>
+      <p:pic>
+        <p:nvPicPr>
+          <p:cNvPr id="4" name="Imagen 3">
+            <a:extLst>
+              <a:ext uri="{FF2B5EF4-FFF2-40B4-BE49-F238E27FC236}">
+                <a16:creationId xmlns:a16="http://schemas.microsoft.com/office/drawing/2014/main" id="{7E722B25-4914-E033-9CFB-1F6553C5BE58}"/>
+              </a:ext>
+            </a:extLst>
+          </p:cNvPr>
+          <p:cNvPicPr>
+            <a:picLocks noChangeAspect="1"/>
+          </p:cNvPicPr>
+          <p:nvPr/>
+        </p:nvPicPr>
+        <p:blipFill>
+          <a:blip r:embed="rId3"/>
+          <a:stretch>
+            <a:fillRect/>
+          </a:stretch>
+        </p:blipFill>
+        <p:spPr>
+          <a:xfrm>
+            <a:off x="546913" y="3590469"/>
+            <a:ext cx="10868339" cy="3194379"/>
+          </a:xfrm>
+          <a:prstGeom prst="rect">
+            <a:avLst/>
+          </a:prstGeom>
+        </p:spPr>
+      </p:pic>
     </p:spTree>
     <p:extLst>
       <p:ext uri="{BB962C8B-B14F-4D97-AF65-F5344CB8AC3E}">
-        <p14:creationId xmlns:p14="http://schemas.microsoft.com/office/powerpoint/2010/main" val="1277698558"/>
+        <p14:creationId xmlns:p14="http://schemas.microsoft.com/office/powerpoint/2010/main" val="443342292"/>
       </p:ext>
     </p:extLst>
   </p:cSld>

</xml_diff>